<commit_message>
fixed Game presentation for usefull transfer across computers
</commit_message>
<xml_diff>
--- a/OGPC5 Game/Project Resources/Presentation/Urban Towers -Game.pptx
+++ b/OGPC5 Game/Project Resources/Presentation/Urban Towers -Game.pptx
@@ -240,7 +240,7 @@
           <a:p>
             <a:fld id="{5640EA47-C0BC-47B7-81AE-E77237F09D98}" type="datetimeFigureOut">
               <a:rPr lang="en-US" smtClean="0"/>
-              <a:t>04/27/2012</a:t>
+              <a:t>04/28/2012</a:t>
             </a:fld>
             <a:endParaRPr lang="en-US"/>
           </a:p>
@@ -873,7 +873,7 @@
           <a:p>
             <a:fld id="{5640EA47-C0BC-47B7-81AE-E77237F09D98}" type="datetimeFigureOut">
               <a:rPr lang="en-US" smtClean="0"/>
-              <a:t>04/27/2012</a:t>
+              <a:t>04/28/2012</a:t>
             </a:fld>
             <a:endParaRPr lang="en-US"/>
           </a:p>
@@ -1150,7 +1150,7 @@
           <a:p>
             <a:fld id="{5640EA47-C0BC-47B7-81AE-E77237F09D98}" type="datetimeFigureOut">
               <a:rPr lang="en-US" smtClean="0"/>
-              <a:t>04/27/2012</a:t>
+              <a:t>04/28/2012</a:t>
             </a:fld>
             <a:endParaRPr lang="en-US"/>
           </a:p>
@@ -1315,7 +1315,7 @@
           <a:p>
             <a:fld id="{5640EA47-C0BC-47B7-81AE-E77237F09D98}" type="datetimeFigureOut">
               <a:rPr lang="en-US" smtClean="0"/>
-              <a:t>04/27/2012</a:t>
+              <a:t>04/28/2012</a:t>
             </a:fld>
             <a:endParaRPr lang="en-US"/>
           </a:p>
@@ -1496,7 +1496,7 @@
           <a:p>
             <a:fld id="{5640EA47-C0BC-47B7-81AE-E77237F09D98}" type="datetimeFigureOut">
               <a:rPr lang="en-US" smtClean="0"/>
-              <a:t>04/27/2012</a:t>
+              <a:t>04/28/2012</a:t>
             </a:fld>
             <a:endParaRPr lang="en-US"/>
           </a:p>
@@ -2141,7 +2141,7 @@
           <a:p>
             <a:fld id="{5640EA47-C0BC-47B7-81AE-E77237F09D98}" type="datetimeFigureOut">
               <a:rPr lang="en-US" smtClean="0"/>
-              <a:t>04/27/2012</a:t>
+              <a:t>04/28/2012</a:t>
             </a:fld>
             <a:endParaRPr lang="en-US"/>
           </a:p>
@@ -2567,7 +2567,7 @@
           <a:p>
             <a:fld id="{5640EA47-C0BC-47B7-81AE-E77237F09D98}" type="datetimeFigureOut">
               <a:rPr lang="en-US" smtClean="0"/>
-              <a:t>04/27/2012</a:t>
+              <a:t>04/28/2012</a:t>
             </a:fld>
             <a:endParaRPr lang="en-US"/>
           </a:p>
@@ -2680,7 +2680,7 @@
           <a:p>
             <a:fld id="{5640EA47-C0BC-47B7-81AE-E77237F09D98}" type="datetimeFigureOut">
               <a:rPr lang="en-US" smtClean="0"/>
-              <a:t>04/27/2012</a:t>
+              <a:t>04/28/2012</a:t>
             </a:fld>
             <a:endParaRPr lang="en-US"/>
           </a:p>
@@ -2861,7 +2861,7 @@
           <a:p>
             <a:fld id="{5640EA47-C0BC-47B7-81AE-E77237F09D98}" type="datetimeFigureOut">
               <a:rPr lang="en-US" smtClean="0"/>
-              <a:t>04/27/2012</a:t>
+              <a:t>04/28/2012</a:t>
             </a:fld>
             <a:endParaRPr lang="en-US"/>
           </a:p>
@@ -3127,7 +3127,7 @@
           <a:p>
             <a:fld id="{5640EA47-C0BC-47B7-81AE-E77237F09D98}" type="datetimeFigureOut">
               <a:rPr lang="en-US" smtClean="0"/>
-              <a:t>04/27/2012</a:t>
+              <a:t>04/28/2012</a:t>
             </a:fld>
             <a:endParaRPr lang="en-US"/>
           </a:p>
@@ -3597,7 +3597,7 @@
           <a:p>
             <a:fld id="{5640EA47-C0BC-47B7-81AE-E77237F09D98}" type="datetimeFigureOut">
               <a:rPr lang="en-US" smtClean="0"/>
-              <a:t>04/27/2012</a:t>
+              <a:t>04/28/2012</a:t>
             </a:fld>
             <a:endParaRPr lang="en-US"/>
           </a:p>
@@ -4157,7 +4157,7 @@
           <a:p>
             <a:fld id="{5640EA47-C0BC-47B7-81AE-E77237F09D98}" type="datetimeFigureOut">
               <a:rPr lang="en-US" smtClean="0"/>
-              <a:t>04/27/2012</a:t>
+              <a:t>04/28/2012</a:t>
             </a:fld>
             <a:endParaRPr lang="en-US"/>
           </a:p>
@@ -5392,8 +5392,16 @@
           <a:p>
             <a:pPr lvl="2"/>
             <a:r>
-              <a:rPr lang="en-US" dirty="0" smtClean="0"/>
-              <a:t>50+ of one tower type</a:t>
+              <a:rPr lang="en-US" smtClean="0"/>
+              <a:t>2</a:t>
+            </a:r>
+            <a:r>
+              <a:rPr lang="en-US" smtClean="0"/>
+              <a:t>0</a:t>
+            </a:r>
+            <a:r>
+              <a:rPr lang="en-US" dirty="0" smtClean="0"/>
+              <a:t>+ of one tower type</a:t>
             </a:r>
           </a:p>
           <a:p>
@@ -5772,6 +5780,13 @@
             <a:r>
               <a:rPr lang="en-US" dirty="0" smtClean="0"/>
               <a:t>Audacity</a:t>
+            </a:r>
+          </a:p>
+          <a:p>
+            <a:pPr lvl="1"/>
+            <a:r>
+              <a:rPr lang="en-US" dirty="0" smtClean="0"/>
+              <a:t>FL Studio</a:t>
             </a:r>
             <a:endParaRPr lang="en-US" dirty="0"/>
           </a:p>

</xml_diff>